<commit_message>
Updated functions with functions to pull/push task list. NOT complete yet, but commands work
</commit_message>
<xml_diff>
--- a/SimWorkflow.pptx
+++ b/SimWorkflow.pptx
@@ -7547,6 +7547,96 @@
           </a:fontRef>
         </p:style>
       </p:cxnSp>
+      <p:sp>
+        <p:nvSpPr>
+          <p:cNvPr id="14" name="Left Brace 13">
+            <a:extLst>
+              <a:ext uri="{FF2B5EF4-FFF2-40B4-BE49-F238E27FC236}">
+                <a16:creationId xmlns:a16="http://schemas.microsoft.com/office/drawing/2014/main" id="{2CA656EE-9FBC-4795-9A87-898DF4F55003}"/>
+              </a:ext>
+            </a:extLst>
+          </p:cNvPr>
+          <p:cNvSpPr/>
+          <p:nvPr/>
+        </p:nvSpPr>
+        <p:spPr>
+          <a:xfrm>
+            <a:off x="5869299" y="8367378"/>
+            <a:ext cx="121622" cy="816366"/>
+          </a:xfrm>
+          <a:prstGeom prst="leftBrace">
+            <a:avLst/>
+          </a:prstGeom>
+          <a:ln>
+            <a:solidFill>
+              <a:schemeClr val="tx1"/>
+            </a:solidFill>
+          </a:ln>
+        </p:spPr>
+        <p:style>
+          <a:lnRef idx="1">
+            <a:schemeClr val="accent1"/>
+          </a:lnRef>
+          <a:fillRef idx="0">
+            <a:schemeClr val="accent1"/>
+          </a:fillRef>
+          <a:effectRef idx="0">
+            <a:schemeClr val="accent1"/>
+          </a:effectRef>
+          <a:fontRef idx="minor">
+            <a:schemeClr val="tx1"/>
+          </a:fontRef>
+        </p:style>
+        <p:txBody>
+          <a:bodyPr rtlCol="0" anchor="ctr"/>
+          <a:lstStyle/>
+          <a:p>
+            <a:pPr algn="ctr"/>
+            <a:endParaRPr lang="en-US"/>
+          </a:p>
+        </p:txBody>
+      </p:sp>
+      <p:sp>
+        <p:nvSpPr>
+          <p:cNvPr id="16" name="TextBox 15">
+            <a:extLst>
+              <a:ext uri="{FF2B5EF4-FFF2-40B4-BE49-F238E27FC236}">
+                <a16:creationId xmlns:a16="http://schemas.microsoft.com/office/drawing/2014/main" id="{1B226E5A-FD4D-45FB-86DE-9AC13E5FC193}"/>
+              </a:ext>
+            </a:extLst>
+          </p:cNvPr>
+          <p:cNvSpPr txBox="1"/>
+          <p:nvPr/>
+        </p:nvSpPr>
+        <p:spPr>
+          <a:xfrm>
+            <a:off x="3429011" y="8652450"/>
+            <a:ext cx="2137124" cy="246221"/>
+          </a:xfrm>
+          <a:prstGeom prst="rect">
+            <a:avLst/>
+          </a:prstGeom>
+          <a:noFill/>
+          <a:ln>
+            <a:solidFill>
+              <a:schemeClr val="tx1"/>
+            </a:solidFill>
+          </a:ln>
+        </p:spPr>
+        <p:txBody>
+          <a:bodyPr wrap="none" rtlCol="0">
+            <a:spAutoFit/>
+          </a:bodyPr>
+          <a:lstStyle/>
+          <a:p>
+            <a:pPr algn="ctr"/>
+            <a:r>
+              <a:rPr lang="en-US" sz="1000" dirty="0"/>
+              <a:t>Should happen near instantaneously</a:t>
+            </a:r>
+          </a:p>
+        </p:txBody>
+      </p:sp>
     </p:spTree>
     <p:extLst>
       <p:ext uri="{BB962C8B-B14F-4D97-AF65-F5344CB8AC3E}">

</xml_diff>